<commit_message>
update seminar ppt file
</commit_message>
<xml_diff>
--- a/document/비즈니스를_위한_데이터과학_7장.pptx
+++ b/document/비즈니스를_위한_데이터과학_7장.pptx
@@ -224,7 +224,7 @@
           <a:p>
             <a:fld id="{1A0422B8-B0E6-404C-B8B1-05A56A924E5F}" type="datetimeFigureOut">
               <a:rPr lang="ko-KR" altLang="en-US" smtClean="0"/>
-              <a:t>2021-08-09</a:t>
+              <a:t>2021-08-13</a:t>
             </a:fld>
             <a:endParaRPr lang="ko-KR" altLang="en-US"/>
           </a:p>
@@ -390,7 +390,7 @@
           <a:p>
             <a:fld id="{23347A43-7294-4111-BCAD-D4E341323D7A}" type="datetimeFigureOut">
               <a:rPr lang="ko-KR" altLang="en-US" smtClean="0"/>
-              <a:t>2021-08-09</a:t>
+              <a:t>2021-08-13</a:t>
             </a:fld>
             <a:endParaRPr lang="ko-KR" altLang="en-US"/>
           </a:p>
@@ -3382,7 +3382,7 @@
           <a:p>
             <a:fld id="{98725E75-51B1-4229-A3AF-C83467F3C4A8}" type="datetime1">
               <a:rPr lang="ko-KR" altLang="en-US" smtClean="0"/>
-              <a:t>2021-08-09</a:t>
+              <a:t>2021-08-13</a:t>
             </a:fld>
             <a:endParaRPr lang="ko-KR" altLang="en-US"/>
           </a:p>
@@ -3552,7 +3552,7 @@
           <a:p>
             <a:fld id="{115AABA6-2971-4656-B940-1869CA468FE7}" type="datetime1">
               <a:rPr lang="ko-KR" altLang="en-US" smtClean="0"/>
-              <a:t>2021-08-09</a:t>
+              <a:t>2021-08-13</a:t>
             </a:fld>
             <a:endParaRPr lang="ko-KR" altLang="en-US"/>
           </a:p>
@@ -3732,7 +3732,7 @@
           <a:p>
             <a:fld id="{2C703CDC-A429-4E4E-A8A5-7F879BB621C5}" type="datetime1">
               <a:rPr lang="ko-KR" altLang="en-US" smtClean="0"/>
-              <a:t>2021-08-09</a:t>
+              <a:t>2021-08-13</a:t>
             </a:fld>
             <a:endParaRPr lang="ko-KR" altLang="en-US"/>
           </a:p>
@@ -3924,7 +3924,7 @@
           <a:p>
             <a:fld id="{B973CB1D-823D-49C8-9656-6C15E4505FE2}" type="datetime1">
               <a:rPr kumimoji="1" lang="ko-KR" altLang="en-US" smtClean="0"/>
-              <a:t>2021-08-09</a:t>
+              <a:t>2021-08-13</a:t>
             </a:fld>
             <a:endParaRPr kumimoji="1" lang="ko-KR" altLang="en-US"/>
           </a:p>
@@ -4070,7 +4070,7 @@
           <a:p>
             <a:fld id="{FFB3DA8E-9C0A-415A-80C3-B647C1BEEEBA}" type="datetime1">
               <a:rPr kumimoji="1" lang="ko-KR" altLang="en-US" smtClean="0"/>
-              <a:t>2021-08-09</a:t>
+              <a:t>2021-08-13</a:t>
             </a:fld>
             <a:endParaRPr kumimoji="1" lang="ko-KR" altLang="en-US"/>
           </a:p>
@@ -4319,7 +4319,7 @@
           <a:p>
             <a:fld id="{C8828800-43AD-4E2E-B20F-14CD71341A15}" type="datetime1">
               <a:rPr kumimoji="1" lang="ko-KR" altLang="en-US" smtClean="0"/>
-              <a:t>2021-08-09</a:t>
+              <a:t>2021-08-13</a:t>
             </a:fld>
             <a:endParaRPr kumimoji="1" lang="ko-KR" altLang="en-US"/>
           </a:p>
@@ -4503,7 +4503,7 @@
           <a:p>
             <a:fld id="{1433136E-B5A7-4CAC-B7AC-3D8D6479D899}" type="datetime1">
               <a:rPr kumimoji="1" lang="ko-KR" altLang="en-US" smtClean="0"/>
-              <a:t>2021-08-09</a:t>
+              <a:t>2021-08-13</a:t>
             </a:fld>
             <a:endParaRPr kumimoji="1" lang="ko-KR" altLang="en-US"/>
           </a:p>
@@ -4832,7 +4832,7 @@
           <a:p>
             <a:fld id="{91029A8C-5D9F-44D7-AAB1-11BD4BA00046}" type="datetime1">
               <a:rPr kumimoji="1" lang="ko-KR" altLang="en-US" smtClean="0"/>
-              <a:t>2021-08-09</a:t>
+              <a:t>2021-08-13</a:t>
             </a:fld>
             <a:endParaRPr kumimoji="1" lang="ko-KR" altLang="en-US"/>
           </a:p>
@@ -4950,7 +4950,7 @@
           <a:p>
             <a:fld id="{FD76E51F-43B5-47AF-BACF-EADEB99780E4}" type="datetime1">
               <a:rPr kumimoji="1" lang="ko-KR" altLang="en-US" smtClean="0"/>
-              <a:t>2021-08-09</a:t>
+              <a:t>2021-08-13</a:t>
             </a:fld>
             <a:endParaRPr kumimoji="1" lang="ko-KR" altLang="en-US"/>
           </a:p>
@@ -5045,7 +5045,7 @@
           <a:p>
             <a:fld id="{CEFF33AF-DD51-4BDD-83E0-D1A05355731C}" type="datetime1">
               <a:rPr kumimoji="1" lang="ko-KR" altLang="en-US" smtClean="0"/>
-              <a:t>2021-08-09</a:t>
+              <a:t>2021-08-13</a:t>
             </a:fld>
             <a:endParaRPr kumimoji="1" lang="ko-KR" altLang="en-US"/>
           </a:p>
@@ -5303,7 +5303,7 @@
           <a:p>
             <a:fld id="{1C354884-675B-4918-BA18-3DAC28FE7773}" type="datetime1">
               <a:rPr kumimoji="1" lang="ko-KR" altLang="en-US" smtClean="0"/>
-              <a:t>2021-08-09</a:t>
+              <a:t>2021-08-13</a:t>
             </a:fld>
             <a:endParaRPr kumimoji="1" lang="ko-KR" altLang="en-US"/>
           </a:p>
@@ -5473,7 +5473,7 @@
           <a:p>
             <a:fld id="{77E9B61A-E40B-40AF-A3F6-CB0C27976B13}" type="datetime1">
               <a:rPr lang="ko-KR" altLang="en-US" smtClean="0"/>
-              <a:t>2021-08-09</a:t>
+              <a:t>2021-08-13</a:t>
             </a:fld>
             <a:endParaRPr lang="ko-KR" altLang="en-US"/>
           </a:p>
@@ -5735,7 +5735,7 @@
           <a:p>
             <a:fld id="{49E34130-D781-4331-B3C1-6C1774842A60}" type="datetime1">
               <a:rPr kumimoji="1" lang="ko-KR" altLang="en-US" smtClean="0"/>
-              <a:t>2021-08-09</a:t>
+              <a:t>2021-08-13</a:t>
             </a:fld>
             <a:endParaRPr kumimoji="1" lang="ko-KR" altLang="en-US"/>
           </a:p>
@@ -5881,7 +5881,7 @@
           <a:p>
             <a:fld id="{CB1E8AEB-B703-47EA-9FE6-2B297642CEBD}" type="datetime1">
               <a:rPr kumimoji="1" lang="ko-KR" altLang="en-US" smtClean="0"/>
-              <a:t>2021-08-09</a:t>
+              <a:t>2021-08-13</a:t>
             </a:fld>
             <a:endParaRPr kumimoji="1" lang="ko-KR" altLang="en-US"/>
           </a:p>
@@ -6037,7 +6037,7 @@
           <a:p>
             <a:fld id="{EB478915-DD84-461C-912A-ECF1AC53396E}" type="datetime1">
               <a:rPr kumimoji="1" lang="ko-KR" altLang="en-US" smtClean="0"/>
-              <a:t>2021-08-09</a:t>
+              <a:t>2021-08-13</a:t>
             </a:fld>
             <a:endParaRPr kumimoji="1" lang="ko-KR" altLang="en-US"/>
           </a:p>
@@ -6281,7 +6281,7 @@
           <a:p>
             <a:fld id="{6C72F9DE-7DC2-4238-A739-14761A548EC1}" type="datetime1">
               <a:rPr lang="ko-KR" altLang="en-US" smtClean="0"/>
-              <a:t>2021-08-09</a:t>
+              <a:t>2021-08-13</a:t>
             </a:fld>
             <a:endParaRPr lang="ko-KR" altLang="en-US"/>
           </a:p>
@@ -6513,7 +6513,7 @@
           <a:p>
             <a:fld id="{E489EBF8-CF7A-4E5C-BC97-B50FF4462A72}" type="datetime1">
               <a:rPr lang="ko-KR" altLang="en-US" smtClean="0"/>
-              <a:t>2021-08-09</a:t>
+              <a:t>2021-08-13</a:t>
             </a:fld>
             <a:endParaRPr lang="ko-KR" altLang="en-US"/>
           </a:p>
@@ -6880,7 +6880,7 @@
           <a:p>
             <a:fld id="{835DC070-9049-4B22-A834-D6C7CAA07A61}" type="datetime1">
               <a:rPr lang="ko-KR" altLang="en-US" smtClean="0"/>
-              <a:t>2021-08-09</a:t>
+              <a:t>2021-08-13</a:t>
             </a:fld>
             <a:endParaRPr lang="ko-KR" altLang="en-US"/>
           </a:p>
@@ -6998,7 +6998,7 @@
           <a:p>
             <a:fld id="{0E33DE11-7090-48D5-AE3F-C334CC1C584F}" type="datetime1">
               <a:rPr lang="ko-KR" altLang="en-US" smtClean="0"/>
-              <a:t>2021-08-09</a:t>
+              <a:t>2021-08-13</a:t>
             </a:fld>
             <a:endParaRPr lang="ko-KR" altLang="en-US"/>
           </a:p>
@@ -7093,7 +7093,7 @@
           <a:p>
             <a:fld id="{88E6320B-1FDE-466A-B263-54FE685C92C5}" type="datetime1">
               <a:rPr lang="ko-KR" altLang="en-US" smtClean="0"/>
-              <a:t>2021-08-09</a:t>
+              <a:t>2021-08-13</a:t>
             </a:fld>
             <a:endParaRPr lang="ko-KR" altLang="en-US"/>
           </a:p>
@@ -7370,7 +7370,7 @@
           <a:p>
             <a:fld id="{069B2D89-45EB-4486-8E0E-5C35A0FEBEB9}" type="datetime1">
               <a:rPr lang="ko-KR" altLang="en-US" smtClean="0"/>
-              <a:t>2021-08-09</a:t>
+              <a:t>2021-08-13</a:t>
             </a:fld>
             <a:endParaRPr lang="ko-KR" altLang="en-US"/>
           </a:p>
@@ -7627,7 +7627,7 @@
           <a:p>
             <a:fld id="{792C1FAF-84C3-4C2D-A1BB-FF5DA09D6950}" type="datetime1">
               <a:rPr lang="ko-KR" altLang="en-US" smtClean="0"/>
-              <a:t>2021-08-09</a:t>
+              <a:t>2021-08-13</a:t>
             </a:fld>
             <a:endParaRPr lang="ko-KR" altLang="en-US"/>
           </a:p>
@@ -7840,7 +7840,7 @@
           <a:p>
             <a:fld id="{F6579B59-8AAE-499C-90F4-4AC38CB4FB6D}" type="datetime1">
               <a:rPr lang="ko-KR" altLang="en-US" smtClean="0"/>
-              <a:t>2021-08-09</a:t>
+              <a:t>2021-08-13</a:t>
             </a:fld>
             <a:endParaRPr lang="ko-KR" altLang="en-US"/>
           </a:p>
@@ -8357,7 +8357,7 @@
           <a:p>
             <a:fld id="{41D2C8D1-BF39-4DA2-AFEA-B01C4940DF5B}" type="datetime1">
               <a:rPr kumimoji="1" lang="ko-KR" altLang="en-US" smtClean="0"/>
-              <a:t>2021-08-09</a:t>
+              <a:t>2021-08-13</a:t>
             </a:fld>
             <a:endParaRPr kumimoji="1" lang="ko-KR" altLang="en-US"/>
           </a:p>
@@ -9008,7 +9008,7 @@
                 </a:solidFill>
               </a:rPr>
               <a:pPr/>
-              <a:t>August 9, 2021</a:t>
+              <a:t>August 13, 2021</a:t>
             </a:fld>
             <a:endParaRPr lang="ko-KR" altLang="en-US" sz="1400" dirty="0">
               <a:solidFill>
@@ -19497,21 +19497,39 @@
               <a:rPr lang="en-US" altLang="ko-KR" sz="1400" dirty="0">
                 <a:latin typeface="+mn-ea"/>
               </a:rPr>
-              <a:t>b(Y, </a:t>
+              <a:t>c</a:t>
             </a:r>
             <a:r>
               <a:rPr lang="en-US" altLang="ko-KR" sz="1400" dirty="0" smtClean="0">
                 <a:latin typeface="+mn-ea"/>
               </a:rPr>
-              <a:t>n) = -1000 </a:t>
-            </a:r>
-          </a:p>
-          <a:p>
+              <a:t>(Y</a:t>
+            </a:r>
+            <a:r>
+              <a:rPr lang="en-US" altLang="ko-KR" sz="1400" dirty="0">
+                <a:latin typeface="+mn-ea"/>
+              </a:rPr>
+              <a:t>, </a:t>
+            </a:r>
             <a:r>
               <a:rPr lang="en-US" altLang="ko-KR" sz="1400" dirty="0" smtClean="0">
                 <a:latin typeface="+mn-ea"/>
               </a:rPr>
-              <a:t>b(N, </a:t>
+              <a:t>n) = -1000 </a:t>
+            </a:r>
+          </a:p>
+          <a:p>
+            <a:r>
+              <a:rPr lang="en-US" altLang="ko-KR" sz="1400" dirty="0">
+                <a:latin typeface="+mn-ea"/>
+              </a:rPr>
+              <a:t>c</a:t>
+            </a:r>
+            <a:r>
+              <a:rPr lang="en-US" altLang="ko-KR" sz="1400" dirty="0" smtClean="0">
+                <a:latin typeface="+mn-ea"/>
+              </a:rPr>
+              <a:t>(N, </a:t>
             </a:r>
             <a:r>
               <a:rPr lang="en-US" altLang="ko-KR" sz="1400" dirty="0">
@@ -21461,7 +21479,7 @@
             <p:spPr>
               <a:xfrm>
                 <a:off x="3649537" y="3157542"/>
-                <a:ext cx="2927981" cy="984885"/>
+                <a:ext cx="4055919" cy="984885"/>
               </a:xfrm>
               <a:prstGeom prst="rect">
                 <a:avLst/>
@@ -21592,7 +21610,27 @@
               <a:p>
                 <a:r>
                   <a:rPr lang="ko-KR" altLang="en-US" b="1" u="sng" dirty="0" smtClean="0"/>
-                  <a:t>관찰 대상의 변경</a:t>
+                  <a:t>사전 확률</a:t>
+                </a:r>
+                <a:r>
+                  <a:rPr lang="en-US" altLang="ko-KR" b="1" u="sng" dirty="0" smtClean="0"/>
+                  <a:t>(</a:t>
+                </a:r>
+                <a:r>
+                  <a:rPr lang="ko-KR" altLang="en-US" b="1" u="sng" dirty="0" smtClean="0"/>
+                  <a:t>각 클래스를 접할 확률</a:t>
+                </a:r>
+                <a:r>
+                  <a:rPr lang="en-US" altLang="ko-KR" b="1" u="sng" dirty="0" smtClean="0"/>
+                  <a:t>)</a:t>
+                </a:r>
+                <a:r>
+                  <a:rPr lang="ko-KR" altLang="en-US" b="1" u="sng" dirty="0"/>
+                  <a:t> </a:t>
+                </a:r>
+                <a:r>
+                  <a:rPr lang="ko-KR" altLang="en-US" b="1" u="sng" dirty="0" smtClean="0"/>
+                  <a:t>적용</a:t>
                 </a:r>
                 <a:endParaRPr lang="ko-KR" altLang="en-US" b="1" u="sng" dirty="0"/>
               </a:p>
@@ -21611,7 +21649,7 @@
             <p:spPr>
               <a:xfrm>
                 <a:off x="3649537" y="3157542"/>
-                <a:ext cx="2927981" cy="984885"/>
+                <a:ext cx="4055919" cy="984885"/>
               </a:xfrm>
               <a:prstGeom prst="rect">
                 <a:avLst/>
@@ -21619,7 +21657,7 @@
               <a:blipFill>
                 <a:blip r:embed="rId6"/>
                 <a:stretch>
-                  <a:fillRect l="-1875" b="-7407"/>
+                  <a:fillRect l="-1353" r="-451" b="-8642"/>
                 </a:stretch>
               </a:blipFill>
             </p:spPr>
@@ -24301,24 +24339,7 @@
                 <a:ea typeface="NanumGothic" panose="020D0604000000000000" pitchFamily="34" charset="-127"/>
                 <a:cs typeface="+mn-cs"/>
               </a:rPr>
-              <a:t>평가와 </a:t>
-            </a:r>
-            <a:r>
-              <a:rPr kumimoji="1" lang="ko-KR" altLang="en-US" sz="3600" b="1" i="0" u="none" strike="noStrike" kern="1200" cap="none" spc="0" normalizeH="0" baseline="0" noProof="0" dirty="0" smtClean="0">
-                <a:ln>
-                  <a:noFill/>
-                </a:ln>
-                <a:solidFill>
-                  <a:prstClr val="black"/>
-                </a:solidFill>
-                <a:effectLst/>
-                <a:uLnTx/>
-                <a:uFillTx/>
-                <a:latin typeface="Calibri" panose="020F0502020204030204"/>
-                <a:ea typeface="NanumGothic" panose="020D0604000000000000" pitchFamily="34" charset="-127"/>
-                <a:cs typeface="+mn-cs"/>
-              </a:rPr>
-              <a:t>성능 기준선</a:t>
+              <a:t>평가와 성능 기준선</a:t>
             </a:r>
             <a:endParaRPr kumimoji="1" lang="ko-KR" altLang="en-US" sz="3600" b="1" i="0" u="none" strike="noStrike" kern="1200" cap="none" spc="0" normalizeH="0" baseline="0" noProof="0" dirty="0">
               <a:ln>
@@ -24729,17 +24750,7 @@
                 <a:latin typeface="Calibri" panose="020F0502020204030204"/>
                 <a:ea typeface="나눔스퀘어_ac ExtraBold" panose="020B0600000101010101" pitchFamily="50" charset="-127"/>
               </a:rPr>
-              <a:t>평가와 </a:t>
-            </a:r>
-            <a:r>
-              <a:rPr lang="ko-KR" altLang="en-US" sz="2000" b="1" noProof="0" dirty="0" smtClean="0">
-                <a:solidFill>
-                  <a:prstClr val="black"/>
-                </a:solidFill>
-                <a:latin typeface="Calibri" panose="020F0502020204030204"/>
-                <a:ea typeface="나눔스퀘어_ac ExtraBold" panose="020B0600000101010101" pitchFamily="50" charset="-127"/>
-              </a:rPr>
-              <a:t>성능 기준선</a:t>
+              <a:t>평가와 성능 기준선</a:t>
             </a:r>
             <a:endParaRPr kumimoji="0" lang="en-US" altLang="ko-KR" sz="2000" b="1" i="0" u="none" strike="noStrike" kern="1200" cap="none" spc="0" normalizeH="0" baseline="0" noProof="0" dirty="0">
               <a:ln>
@@ -25095,41 +25106,7 @@
                 <a:ea typeface="맑은 고딕" panose="020B0503020000020004" pitchFamily="50" charset="-127"/>
                 <a:cs typeface="+mn-cs"/>
               </a:rPr>
-              <a:t>(</a:t>
-            </a:r>
-            <a:r>
-              <a:rPr kumimoji="0" lang="en-US" altLang="ko-KR" sz="1800" b="1" i="0" u="none" strike="noStrike" kern="1200" cap="none" spc="0" normalizeH="0" baseline="0" noProof="0" dirty="0" smtClean="0">
-                <a:ln>
-                  <a:noFill/>
-                </a:ln>
-                <a:solidFill>
-                  <a:prstClr val="black"/>
-                </a:solidFill>
-                <a:effectLst/>
-                <a:uLnTx/>
-                <a:uFillTx/>
-                <a:latin typeface="Calibri" panose="020F0502020204030204"/>
-                <a:ea typeface="맑은 고딕" panose="020B0503020000020004" pitchFamily="50" charset="-127"/>
-                <a:cs typeface="+mn-cs"/>
-              </a:rPr>
-              <a:t>Baseline Model, Vanilla Model</a:t>
-            </a:r>
-            <a:r>
-              <a:rPr kumimoji="0" lang="en-US" altLang="ko-KR" sz="1800" b="1" i="0" u="none" strike="noStrike" kern="1200" cap="none" spc="0" normalizeH="0" baseline="0" noProof="0" dirty="0" smtClean="0">
-                <a:ln>
-                  <a:noFill/>
-                </a:ln>
-                <a:solidFill>
-                  <a:prstClr val="black"/>
-                </a:solidFill>
-                <a:effectLst/>
-                <a:uLnTx/>
-                <a:uFillTx/>
-                <a:latin typeface="Calibri" panose="020F0502020204030204"/>
-                <a:ea typeface="맑은 고딕" panose="020B0503020000020004" pitchFamily="50" charset="-127"/>
-                <a:cs typeface="+mn-cs"/>
-              </a:rPr>
-              <a:t>)</a:t>
+              <a:t>(Baseline Model, Vanilla Model)</a:t>
             </a:r>
             <a:r>
               <a:rPr kumimoji="0" lang="ko-KR" altLang="en-US" sz="1800" b="1" i="0" u="none" strike="noStrike" kern="1200" cap="none" spc="0" normalizeH="0" baseline="0" noProof="0" dirty="0" smtClean="0">
@@ -25809,17 +25786,7 @@
                 <a:latin typeface="Calibri" panose="020F0502020204030204"/>
                 <a:ea typeface="나눔스퀘어_ac ExtraBold" panose="020B0600000101010101" pitchFamily="50" charset="-127"/>
               </a:rPr>
-              <a:t>평가와 </a:t>
-            </a:r>
-            <a:r>
-              <a:rPr lang="ko-KR" altLang="en-US" sz="2000" b="1" noProof="0" dirty="0" smtClean="0">
-                <a:solidFill>
-                  <a:prstClr val="black"/>
-                </a:solidFill>
-                <a:latin typeface="Calibri" panose="020F0502020204030204"/>
-                <a:ea typeface="나눔스퀘어_ac ExtraBold" panose="020B0600000101010101" pitchFamily="50" charset="-127"/>
-              </a:rPr>
-              <a:t>성능 기준선</a:t>
+              <a:t>평가와 성능 기준선</a:t>
             </a:r>
             <a:endParaRPr kumimoji="0" lang="en-US" altLang="ko-KR" sz="2000" b="1" i="0" u="none" strike="noStrike" kern="1200" cap="none" spc="0" normalizeH="0" baseline="0" noProof="0" dirty="0">
               <a:ln>
@@ -28251,7 +28218,7 @@
             </a:r>
             <a:r>
               <a:rPr lang="ko-KR" altLang="en-US" dirty="0" smtClean="0"/>
-              <a:t> 예측 결과값과 실제 값의 비교 결과를 수치로 표현한 것이 </a:t>
+              <a:t> 예측 결과와 실제 값의 비교 결과를 수치로 표현한 것이 </a:t>
             </a:r>
             <a:r>
               <a:rPr lang="ko-KR" altLang="en-US" b="1" dirty="0" smtClean="0"/>
@@ -28758,7 +28725,7 @@
         </p:nvSpPr>
         <p:spPr>
           <a:xfrm>
-            <a:off x="290743" y="1942870"/>
+            <a:off x="286871" y="1820290"/>
             <a:ext cx="8668589" cy="2646878"/>
           </a:xfrm>
           <a:prstGeom prst="rect">
@@ -29058,7 +29025,7 @@
         </p:blipFill>
         <p:spPr>
           <a:xfrm>
-            <a:off x="0" y="4449721"/>
+            <a:off x="0" y="4661978"/>
             <a:ext cx="9144000" cy="1723734"/>
           </a:xfrm>
           <a:prstGeom prst="rect">
@@ -29074,7 +29041,7 @@
         </p:nvSpPr>
         <p:spPr>
           <a:xfrm>
-            <a:off x="4043082" y="5253318"/>
+            <a:off x="4043082" y="5465575"/>
             <a:ext cx="815789" cy="369332"/>
           </a:xfrm>
           <a:prstGeom prst="rect">
@@ -29104,7 +29071,7 @@
         </p:nvSpPr>
         <p:spPr>
           <a:xfrm>
-            <a:off x="7459909" y="5680934"/>
+            <a:off x="7459909" y="5893191"/>
             <a:ext cx="815789" cy="369332"/>
           </a:xfrm>
           <a:prstGeom prst="rect">
@@ -29134,7 +29101,7 @@
         </p:nvSpPr>
         <p:spPr>
           <a:xfrm>
-            <a:off x="4043081" y="5680934"/>
+            <a:off x="4043081" y="5893191"/>
             <a:ext cx="815789" cy="369332"/>
           </a:xfrm>
           <a:prstGeom prst="rect">
@@ -29168,7 +29135,7 @@
         </p:nvSpPr>
         <p:spPr>
           <a:xfrm>
-            <a:off x="7459909" y="5253318"/>
+            <a:off x="7459909" y="5465575"/>
             <a:ext cx="815789" cy="369332"/>
           </a:xfrm>
           <a:prstGeom prst="rect">
@@ -29189,6 +29156,66 @@
             <a:r>
               <a:rPr lang="en-US" altLang="ko-KR" dirty="0"/>
               <a:t>P</a:t>
+            </a:r>
+            <a:endParaRPr lang="ko-KR" altLang="en-US" dirty="0"/>
+          </a:p>
+        </p:txBody>
+      </p:sp>
+      <p:sp>
+        <p:nvSpPr>
+          <p:cNvPr id="6" name="TextBox 5"/>
+          <p:cNvSpPr txBox="1"/>
+          <p:nvPr/>
+        </p:nvSpPr>
+        <p:spPr>
+          <a:xfrm>
+            <a:off x="537882" y="5465575"/>
+            <a:ext cx="484094" cy="369332"/>
+          </a:xfrm>
+          <a:prstGeom prst="rect">
+            <a:avLst/>
+          </a:prstGeom>
+          <a:noFill/>
+        </p:spPr>
+        <p:txBody>
+          <a:bodyPr wrap="square" rtlCol="0">
+            <a:spAutoFit/>
+          </a:bodyPr>
+          <a:lstStyle/>
+          <a:p>
+            <a:r>
+              <a:rPr lang="en-US" altLang="ko-KR" dirty="0" smtClean="0"/>
+              <a:t>P</a:t>
+            </a:r>
+            <a:endParaRPr lang="ko-KR" altLang="en-US" dirty="0"/>
+          </a:p>
+        </p:txBody>
+      </p:sp>
+      <p:sp>
+        <p:nvSpPr>
+          <p:cNvPr id="18" name="TextBox 17"/>
+          <p:cNvSpPr txBox="1"/>
+          <p:nvPr/>
+        </p:nvSpPr>
+        <p:spPr>
+          <a:xfrm>
+            <a:off x="537882" y="5893191"/>
+            <a:ext cx="484094" cy="369332"/>
+          </a:xfrm>
+          <a:prstGeom prst="rect">
+            <a:avLst/>
+          </a:prstGeom>
+          <a:noFill/>
+        </p:spPr>
+        <p:txBody>
+          <a:bodyPr wrap="square" rtlCol="0">
+            <a:spAutoFit/>
+          </a:bodyPr>
+          <a:lstStyle/>
+          <a:p>
+            <a:r>
+              <a:rPr lang="en-US" altLang="ko-KR" dirty="0"/>
+              <a:t>N</a:t>
             </a:r>
             <a:endParaRPr lang="ko-KR" altLang="en-US" dirty="0"/>
           </a:p>
@@ -31788,7 +31815,15 @@
                   <a:srgbClr val="FF0000"/>
                 </a:solidFill>
               </a:rPr>
-              <a:t>(TN)</a:t>
+              <a:t>(</a:t>
+            </a:r>
+            <a:r>
+              <a:rPr lang="en-US" altLang="ko-KR" b="1" dirty="0" smtClean="0">
+                <a:solidFill>
+                  <a:srgbClr val="FF0000"/>
+                </a:solidFill>
+              </a:rPr>
+              <a:t>TP)</a:t>
             </a:r>
             <a:endParaRPr lang="ko-KR" altLang="en-US" b="1" dirty="0">
               <a:solidFill>
@@ -32863,9 +32898,12 @@
 </file>
 
 <file path=customXml/item1.xml><?xml version="1.0" encoding="utf-8"?>
-<p:properties xmlns:p="http://schemas.microsoft.com/office/2006/metadata/properties" xmlns:xsi="http://www.w3.org/2001/XMLSchema-instance" xmlns:pc="http://schemas.microsoft.com/office/infopath/2007/PartnerControls">
-  <documentManagement/>
-</p:properties>
+<?mso-contentType ?>
+<FormTemplates xmlns="http://schemas.microsoft.com/sharepoint/v3/contenttype/forms">
+  <Display>DocumentLibraryForm</Display>
+  <Edit>DocumentLibraryForm</Edit>
+  <New>DocumentLibraryForm</New>
+</FormTemplates>
 </file>
 
 <file path=customXml/item2.xml><?xml version="1.0" encoding="utf-8"?>
@@ -33001,26 +33039,15 @@
 </file>
 
 <file path=customXml/item3.xml><?xml version="1.0" encoding="utf-8"?>
-<?mso-contentType ?>
-<FormTemplates xmlns="http://schemas.microsoft.com/sharepoint/v3/contenttype/forms">
-  <Display>DocumentLibraryForm</Display>
-  <Edit>DocumentLibraryForm</Edit>
-  <New>DocumentLibraryForm</New>
-</FormTemplates>
+<p:properties xmlns:p="http://schemas.microsoft.com/office/2006/metadata/properties" xmlns:xsi="http://www.w3.org/2001/XMLSchema-instance" xmlns:pc="http://schemas.microsoft.com/office/infopath/2007/PartnerControls">
+  <documentManagement/>
+</p:properties>
 </file>
 
 <file path=customXml/itemProps1.xml><?xml version="1.0" encoding="utf-8"?>
-<ds:datastoreItem xmlns:ds="http://schemas.openxmlformats.org/officeDocument/2006/customXml" ds:itemID="{7D5F0C2B-1399-44A3-89A0-7EC1E0908269}">
+<ds:datastoreItem xmlns:ds="http://schemas.openxmlformats.org/officeDocument/2006/customXml" ds:itemID="{C91F5218-4666-47F2-9DD9-D89F8B1968EB}">
   <ds:schemaRefs>
-    <ds:schemaRef ds:uri="http://www.w3.org/XML/1998/namespace"/>
-    <ds:schemaRef ds:uri="http://schemas.microsoft.com/office/2006/documentManagement/types"/>
-    <ds:schemaRef ds:uri="http://schemas.microsoft.com/office/2006/metadata/properties"/>
-    <ds:schemaRef ds:uri="http://schemas.microsoft.com/office/infopath/2007/PartnerControls"/>
-    <ds:schemaRef ds:uri="http://schemas.openxmlformats.org/package/2006/metadata/core-properties"/>
-    <ds:schemaRef ds:uri="http://purl.org/dc/terms/"/>
-    <ds:schemaRef ds:uri="529a1fba-b9cc-4c23-9bb8-89a3da0160d3"/>
-    <ds:schemaRef ds:uri="http://purl.org/dc/dcmitype/"/>
-    <ds:schemaRef ds:uri="http://purl.org/dc/elements/1.1/"/>
+    <ds:schemaRef ds:uri="http://schemas.microsoft.com/sharepoint/v3/contenttype/forms"/>
   </ds:schemaRefs>
 </ds:datastoreItem>
 </file>
@@ -33045,9 +33072,17 @@
 </file>
 
 <file path=customXml/itemProps3.xml><?xml version="1.0" encoding="utf-8"?>
-<ds:datastoreItem xmlns:ds="http://schemas.openxmlformats.org/officeDocument/2006/customXml" ds:itemID="{C91F5218-4666-47F2-9DD9-D89F8B1968EB}">
+<ds:datastoreItem xmlns:ds="http://schemas.openxmlformats.org/officeDocument/2006/customXml" ds:itemID="{7D5F0C2B-1399-44A3-89A0-7EC1E0908269}">
   <ds:schemaRefs>
-    <ds:schemaRef ds:uri="http://schemas.microsoft.com/sharepoint/v3/contenttype/forms"/>
+    <ds:schemaRef ds:uri="http://www.w3.org/XML/1998/namespace"/>
+    <ds:schemaRef ds:uri="http://schemas.microsoft.com/office/2006/documentManagement/types"/>
+    <ds:schemaRef ds:uri="http://schemas.microsoft.com/office/2006/metadata/properties"/>
+    <ds:schemaRef ds:uri="http://schemas.microsoft.com/office/infopath/2007/PartnerControls"/>
+    <ds:schemaRef ds:uri="http://schemas.openxmlformats.org/package/2006/metadata/core-properties"/>
+    <ds:schemaRef ds:uri="http://purl.org/dc/terms/"/>
+    <ds:schemaRef ds:uri="529a1fba-b9cc-4c23-9bb8-89a3da0160d3"/>
+    <ds:schemaRef ds:uri="http://purl.org/dc/dcmitype/"/>
+    <ds:schemaRef ds:uri="http://purl.org/dc/elements/1.1/"/>
   </ds:schemaRefs>
 </ds:datastoreItem>
 </file>
</xml_diff>